<commit_message>
more slides, more detail
</commit_message>
<xml_diff>
--- a/2023-04-26 - Building a serverless Discord bot/PowerShell Summit 2023 - Serverless Discord bot.pptx
+++ b/2023-04-26 - Building a serverless Discord bot/PowerShell Summit 2023 - Serverless Discord bot.pptx
@@ -17,8 +17,11 @@
     <p:sldId id="278" r:id="rId11"/>
     <p:sldId id="279" r:id="rId12"/>
     <p:sldId id="281" r:id="rId13"/>
-    <p:sldId id="282" r:id="rId14"/>
-    <p:sldId id="283" r:id="rId15"/>
+    <p:sldId id="284" r:id="rId14"/>
+    <p:sldId id="286" r:id="rId15"/>
+    <p:sldId id="282" r:id="rId16"/>
+    <p:sldId id="283" r:id="rId17"/>
+    <p:sldId id="285" r:id="rId18"/>
   </p:sldIdLst>
   <p:sldSz cx="12192000" cy="6858000"/>
   <p:notesSz cx="6858000" cy="9144000"/>
@@ -272,7 +275,7 @@
           <a:p>
             <a:fld id="{D46B952B-F692-4DD1-9678-FCDA40C3FC40}" type="datetimeFigureOut">
               <a:rPr lang="en-US" smtClean="0"/>
-              <a:t>3/21/2023</a:t>
+              <a:t>4/2/2023</a:t>
             </a:fld>
             <a:endParaRPr lang="en-US"/>
           </a:p>
@@ -470,7 +473,7 @@
           <a:p>
             <a:fld id="{D46B952B-F692-4DD1-9678-FCDA40C3FC40}" type="datetimeFigureOut">
               <a:rPr lang="en-US" smtClean="0"/>
-              <a:t>3/21/2023</a:t>
+              <a:t>4/2/2023</a:t>
             </a:fld>
             <a:endParaRPr lang="en-US"/>
           </a:p>
@@ -678,7 +681,7 @@
           <a:p>
             <a:fld id="{D46B952B-F692-4DD1-9678-FCDA40C3FC40}" type="datetimeFigureOut">
               <a:rPr lang="en-US" smtClean="0"/>
-              <a:t>3/21/2023</a:t>
+              <a:t>4/2/2023</a:t>
             </a:fld>
             <a:endParaRPr lang="en-US"/>
           </a:p>
@@ -876,7 +879,7 @@
           <a:p>
             <a:fld id="{D46B952B-F692-4DD1-9678-FCDA40C3FC40}" type="datetimeFigureOut">
               <a:rPr lang="en-US" smtClean="0"/>
-              <a:t>3/21/2023</a:t>
+              <a:t>4/2/2023</a:t>
             </a:fld>
             <a:endParaRPr lang="en-US"/>
           </a:p>
@@ -1151,7 +1154,7 @@
           <a:p>
             <a:fld id="{D46B952B-F692-4DD1-9678-FCDA40C3FC40}" type="datetimeFigureOut">
               <a:rPr lang="en-US" smtClean="0"/>
-              <a:t>3/21/2023</a:t>
+              <a:t>4/2/2023</a:t>
             </a:fld>
             <a:endParaRPr lang="en-US"/>
           </a:p>
@@ -1416,7 +1419,7 @@
           <a:p>
             <a:fld id="{D46B952B-F692-4DD1-9678-FCDA40C3FC40}" type="datetimeFigureOut">
               <a:rPr lang="en-US" smtClean="0"/>
-              <a:t>3/21/2023</a:t>
+              <a:t>4/2/2023</a:t>
             </a:fld>
             <a:endParaRPr lang="en-US"/>
           </a:p>
@@ -1828,7 +1831,7 @@
           <a:p>
             <a:fld id="{D46B952B-F692-4DD1-9678-FCDA40C3FC40}" type="datetimeFigureOut">
               <a:rPr lang="en-US" smtClean="0"/>
-              <a:t>3/21/2023</a:t>
+              <a:t>4/2/2023</a:t>
             </a:fld>
             <a:endParaRPr lang="en-US"/>
           </a:p>
@@ -1969,7 +1972,7 @@
           <a:p>
             <a:fld id="{D46B952B-F692-4DD1-9678-FCDA40C3FC40}" type="datetimeFigureOut">
               <a:rPr lang="en-US" smtClean="0"/>
-              <a:t>3/21/2023</a:t>
+              <a:t>4/2/2023</a:t>
             </a:fld>
             <a:endParaRPr lang="en-US"/>
           </a:p>
@@ -2082,7 +2085,7 @@
           <a:p>
             <a:fld id="{D46B952B-F692-4DD1-9678-FCDA40C3FC40}" type="datetimeFigureOut">
               <a:rPr lang="en-US" smtClean="0"/>
-              <a:t>3/21/2023</a:t>
+              <a:t>4/2/2023</a:t>
             </a:fld>
             <a:endParaRPr lang="en-US"/>
           </a:p>
@@ -2393,7 +2396,7 @@
           <a:p>
             <a:fld id="{D46B952B-F692-4DD1-9678-FCDA40C3FC40}" type="datetimeFigureOut">
               <a:rPr lang="en-US" smtClean="0"/>
-              <a:t>3/21/2023</a:t>
+              <a:t>4/2/2023</a:t>
             </a:fld>
             <a:endParaRPr lang="en-US"/>
           </a:p>
@@ -2681,7 +2684,7 @@
           <a:p>
             <a:fld id="{D46B952B-F692-4DD1-9678-FCDA40C3FC40}" type="datetimeFigureOut">
               <a:rPr lang="en-US" smtClean="0"/>
-              <a:t>3/21/2023</a:t>
+              <a:t>4/2/2023</a:t>
             </a:fld>
             <a:endParaRPr lang="en-US"/>
           </a:p>
@@ -2931,7 +2934,7 @@
           <a:p>
             <a:fld id="{D46B952B-F692-4DD1-9678-FCDA40C3FC40}" type="datetimeFigureOut">
               <a:rPr lang="en-US" smtClean="0"/>
-              <a:t>3/21/2023</a:t>
+              <a:t>4/2/2023</a:t>
             </a:fld>
             <a:endParaRPr lang="en-US"/>
           </a:p>
@@ -3719,7 +3722,7 @@
           <p:cNvPr id="2" name="Title 1">
             <a:extLst>
               <a:ext uri="{FF2B5EF4-FFF2-40B4-BE49-F238E27FC236}">
-                <a16:creationId xmlns:a16="http://schemas.microsoft.com/office/drawing/2014/main" id="{FBECC900-50CE-6143-BD63-0FD41482F713}"/>
+                <a16:creationId xmlns:a16="http://schemas.microsoft.com/office/drawing/2014/main" id="{59742D62-9479-2FEC-C9FC-A288EC1A0E17}"/>
               </a:ext>
             </a:extLst>
           </p:cNvPr>
@@ -3737,40 +3740,91 @@
           <a:p>
             <a:r>
               <a:rPr lang="en-US" dirty="0"/>
-              <a:t>Adding Commands</a:t>
-            </a:r>
-          </a:p>
-        </p:txBody>
-      </p:sp>
-      <p:sp>
-        <p:nvSpPr>
-          <p:cNvPr id="3" name="Text Placeholder 2">
-            <a:extLst>
-              <a:ext uri="{FF2B5EF4-FFF2-40B4-BE49-F238E27FC236}">
-                <a16:creationId xmlns:a16="http://schemas.microsoft.com/office/drawing/2014/main" id="{F94C90DE-EBD1-BFFB-B969-40F7A7127CF4}"/>
-              </a:ext>
-            </a:extLst>
-          </p:cNvPr>
-          <p:cNvSpPr>
-            <a:spLocks noGrp="1"/>
-          </p:cNvSpPr>
-          <p:nvPr>
-            <p:ph type="body" idx="1"/>
-          </p:nvPr>
-        </p:nvSpPr>
-        <p:spPr/>
-        <p:txBody>
-          <a:bodyPr/>
-          <a:lstStyle/>
-          <a:p>
-            <a:endParaRPr lang="en-US"/>
+              <a:t>Creating a Discord Bot</a:t>
+            </a:r>
+          </a:p>
+        </p:txBody>
+      </p:sp>
+      <p:sp>
+        <p:nvSpPr>
+          <p:cNvPr id="3" name="Content Placeholder 2">
+            <a:extLst>
+              <a:ext uri="{FF2B5EF4-FFF2-40B4-BE49-F238E27FC236}">
+                <a16:creationId xmlns:a16="http://schemas.microsoft.com/office/drawing/2014/main" id="{2D28C9F1-7BB9-419D-E307-F3BDC4D55D54}"/>
+              </a:ext>
+            </a:extLst>
+          </p:cNvPr>
+          <p:cNvSpPr>
+            <a:spLocks noGrp="1"/>
+          </p:cNvSpPr>
+          <p:nvPr>
+            <p:ph idx="1"/>
+          </p:nvPr>
+        </p:nvSpPr>
+        <p:spPr/>
+        <p:txBody>
+          <a:bodyPr/>
+          <a:lstStyle/>
+          <a:p>
+            <a:r>
+              <a:rPr lang="en-US" dirty="0"/>
+              <a:t>Create Discord App</a:t>
+            </a:r>
+          </a:p>
+          <a:p>
+            <a:r>
+              <a:rPr lang="en-US" dirty="0"/>
+              <a:t>Bot -&gt; Add bot</a:t>
+            </a:r>
+          </a:p>
+          <a:p>
+            <a:r>
+              <a:rPr lang="en-US" dirty="0"/>
+              <a:t>Oauth2 -&gt; URL Generator -&gt;</a:t>
+            </a:r>
+          </a:p>
+          <a:p>
+            <a:pPr lvl="1"/>
+            <a:r>
+              <a:rPr lang="en-US" dirty="0"/>
+              <a:t>bot</a:t>
+            </a:r>
+          </a:p>
+          <a:p>
+            <a:pPr lvl="1"/>
+            <a:r>
+              <a:rPr lang="en-US" dirty="0" err="1"/>
+              <a:t>application.commands</a:t>
+            </a:r>
+            <a:endParaRPr lang="en-US" dirty="0"/>
+          </a:p>
+          <a:p>
+            <a:pPr lvl="1"/>
+            <a:r>
+              <a:rPr lang="en-US" dirty="0"/>
+              <a:t>bot\send messages</a:t>
+            </a:r>
+          </a:p>
+          <a:p>
+            <a:r>
+              <a:rPr lang="en-US" dirty="0"/>
+              <a:t>Add </a:t>
+            </a:r>
+            <a:r>
+              <a:rPr lang="en-US" dirty="0" err="1"/>
+              <a:t>HttpStart</a:t>
+            </a:r>
+            <a:r>
+              <a:rPr lang="en-US" dirty="0"/>
+              <a:t> URI to Interactions Endpoint URL</a:t>
+            </a:r>
           </a:p>
         </p:txBody>
       </p:sp>
     </p:spTree>
     <p:extLst>
       <p:ext uri="{BB962C8B-B14F-4D97-AF65-F5344CB8AC3E}">
-        <p14:creationId xmlns:p14="http://schemas.microsoft.com/office/powerpoint/2010/main" val="3143325720"/>
+        <p14:creationId xmlns:p14="http://schemas.microsoft.com/office/powerpoint/2010/main" val="2618043788"/>
       </p:ext>
     </p:extLst>
   </p:cSld>
@@ -3802,6 +3856,194 @@
           <p:cNvPr id="2" name="Title 1">
             <a:extLst>
               <a:ext uri="{FF2B5EF4-FFF2-40B4-BE49-F238E27FC236}">
+                <a16:creationId xmlns:a16="http://schemas.microsoft.com/office/drawing/2014/main" id="{A40742EB-6100-C42B-D893-91F9BC2D3D0E}"/>
+              </a:ext>
+            </a:extLst>
+          </p:cNvPr>
+          <p:cNvSpPr>
+            <a:spLocks noGrp="1"/>
+          </p:cNvSpPr>
+          <p:nvPr>
+            <p:ph type="title"/>
+          </p:nvPr>
+        </p:nvSpPr>
+        <p:spPr/>
+        <p:txBody>
+          <a:bodyPr/>
+          <a:lstStyle/>
+          <a:p>
+            <a:r>
+              <a:rPr lang="en-US" dirty="0"/>
+              <a:t>Dealing with frostbite</a:t>
+            </a:r>
+          </a:p>
+        </p:txBody>
+      </p:sp>
+      <p:sp>
+        <p:nvSpPr>
+          <p:cNvPr id="3" name="Content Placeholder 2">
+            <a:extLst>
+              <a:ext uri="{FF2B5EF4-FFF2-40B4-BE49-F238E27FC236}">
+                <a16:creationId xmlns:a16="http://schemas.microsoft.com/office/drawing/2014/main" id="{0FF80AB6-017F-914A-05DE-E217E62D4BE3}"/>
+              </a:ext>
+            </a:extLst>
+          </p:cNvPr>
+          <p:cNvSpPr>
+            <a:spLocks noGrp="1"/>
+          </p:cNvSpPr>
+          <p:nvPr>
+            <p:ph idx="1"/>
+          </p:nvPr>
+        </p:nvSpPr>
+        <p:spPr/>
+        <p:txBody>
+          <a:bodyPr/>
+          <a:lstStyle/>
+          <a:p>
+            <a:r>
+              <a:rPr lang="en-US" dirty="0"/>
+              <a:t>PowerShell based Azure Functions have a long cold start</a:t>
+            </a:r>
+          </a:p>
+          <a:p>
+            <a:r>
+              <a:rPr lang="en-US" dirty="0"/>
+              <a:t>Monitor Function</a:t>
+            </a:r>
+          </a:p>
+          <a:p>
+            <a:pPr lvl="1"/>
+            <a:r>
+              <a:rPr lang="en-US" dirty="0"/>
+              <a:t>Every 5m</a:t>
+            </a:r>
+          </a:p>
+          <a:p>
+            <a:r>
+              <a:rPr lang="en-US" dirty="0"/>
+              <a:t>Review Code</a:t>
+            </a:r>
+          </a:p>
+        </p:txBody>
+      </p:sp>
+    </p:spTree>
+    <p:extLst>
+      <p:ext uri="{BB962C8B-B14F-4D97-AF65-F5344CB8AC3E}">
+        <p14:creationId xmlns:p14="http://schemas.microsoft.com/office/powerpoint/2010/main" val="3168010500"/>
+      </p:ext>
+    </p:extLst>
+  </p:cSld>
+  <p:clrMapOvr>
+    <a:masterClrMapping/>
+  </p:clrMapOvr>
+</p:sld>
+</file>
+
+<file path=ppt/slides/slide15.xml><?xml version="1.0" encoding="utf-8"?>
+<p:sld xmlns:a="http://schemas.openxmlformats.org/drawingml/2006/main" xmlns:r="http://schemas.openxmlformats.org/officeDocument/2006/relationships" xmlns:p="http://schemas.openxmlformats.org/presentationml/2006/main">
+  <p:cSld>
+    <p:spTree>
+      <p:nvGrpSpPr>
+        <p:cNvPr id="1" name=""/>
+        <p:cNvGrpSpPr/>
+        <p:nvPr/>
+      </p:nvGrpSpPr>
+      <p:grpSpPr>
+        <a:xfrm>
+          <a:off x="0" y="0"/>
+          <a:ext cx="0" cy="0"/>
+          <a:chOff x="0" y="0"/>
+          <a:chExt cx="0" cy="0"/>
+        </a:xfrm>
+      </p:grpSpPr>
+      <p:sp>
+        <p:nvSpPr>
+          <p:cNvPr id="2" name="Title 1">
+            <a:extLst>
+              <a:ext uri="{FF2B5EF4-FFF2-40B4-BE49-F238E27FC236}">
+                <a16:creationId xmlns:a16="http://schemas.microsoft.com/office/drawing/2014/main" id="{FBECC900-50CE-6143-BD63-0FD41482F713}"/>
+              </a:ext>
+            </a:extLst>
+          </p:cNvPr>
+          <p:cNvSpPr>
+            <a:spLocks noGrp="1"/>
+          </p:cNvSpPr>
+          <p:nvPr>
+            <p:ph type="title"/>
+          </p:nvPr>
+        </p:nvSpPr>
+        <p:spPr/>
+        <p:txBody>
+          <a:bodyPr/>
+          <a:lstStyle/>
+          <a:p>
+            <a:r>
+              <a:rPr lang="en-US" dirty="0"/>
+              <a:t>Adding Commands</a:t>
+            </a:r>
+          </a:p>
+        </p:txBody>
+      </p:sp>
+      <p:sp>
+        <p:nvSpPr>
+          <p:cNvPr id="3" name="Text Placeholder 2">
+            <a:extLst>
+              <a:ext uri="{FF2B5EF4-FFF2-40B4-BE49-F238E27FC236}">
+                <a16:creationId xmlns:a16="http://schemas.microsoft.com/office/drawing/2014/main" id="{F94C90DE-EBD1-BFFB-B969-40F7A7127CF4}"/>
+              </a:ext>
+            </a:extLst>
+          </p:cNvPr>
+          <p:cNvSpPr>
+            <a:spLocks noGrp="1"/>
+          </p:cNvSpPr>
+          <p:nvPr>
+            <p:ph type="body" idx="1"/>
+          </p:nvPr>
+        </p:nvSpPr>
+        <p:spPr/>
+        <p:txBody>
+          <a:bodyPr/>
+          <a:lstStyle/>
+          <a:p>
+            <a:endParaRPr lang="en-US"/>
+          </a:p>
+        </p:txBody>
+      </p:sp>
+    </p:spTree>
+    <p:extLst>
+      <p:ext uri="{BB962C8B-B14F-4D97-AF65-F5344CB8AC3E}">
+        <p14:creationId xmlns:p14="http://schemas.microsoft.com/office/powerpoint/2010/main" val="3143325720"/>
+      </p:ext>
+    </p:extLst>
+  </p:cSld>
+  <p:clrMapOvr>
+    <a:masterClrMapping/>
+  </p:clrMapOvr>
+</p:sld>
+</file>
+
+<file path=ppt/slides/slide16.xml><?xml version="1.0" encoding="utf-8"?>
+<p:sld xmlns:a="http://schemas.openxmlformats.org/drawingml/2006/main" xmlns:r="http://schemas.openxmlformats.org/officeDocument/2006/relationships" xmlns:p="http://schemas.openxmlformats.org/presentationml/2006/main">
+  <p:cSld>
+    <p:spTree>
+      <p:nvGrpSpPr>
+        <p:cNvPr id="1" name=""/>
+        <p:cNvGrpSpPr/>
+        <p:nvPr/>
+      </p:nvGrpSpPr>
+      <p:grpSpPr>
+        <a:xfrm>
+          <a:off x="0" y="0"/>
+          <a:ext cx="0" cy="0"/>
+          <a:chOff x="0" y="0"/>
+          <a:chExt cx="0" cy="0"/>
+        </a:xfrm>
+      </p:grpSpPr>
+      <p:sp>
+        <p:nvSpPr>
+          <p:cNvPr id="2" name="Title 1">
+            <a:extLst>
+              <a:ext uri="{FF2B5EF4-FFF2-40B4-BE49-F238E27FC236}">
                 <a16:creationId xmlns:a16="http://schemas.microsoft.com/office/drawing/2014/main" id="{18133B67-FEE0-DF4C-4D80-404858A55DF3}"/>
               </a:ext>
             </a:extLst>
@@ -3859,6 +4101,170 @@
     <p:extLst>
       <p:ext uri="{BB962C8B-B14F-4D97-AF65-F5344CB8AC3E}">
         <p14:creationId xmlns:p14="http://schemas.microsoft.com/office/powerpoint/2010/main" val="2503600091"/>
+      </p:ext>
+    </p:extLst>
+  </p:cSld>
+  <p:clrMapOvr>
+    <a:masterClrMapping/>
+  </p:clrMapOvr>
+</p:sld>
+</file>
+
+<file path=ppt/slides/slide17.xml><?xml version="1.0" encoding="utf-8"?>
+<p:sld xmlns:a="http://schemas.openxmlformats.org/drawingml/2006/main" xmlns:r="http://schemas.openxmlformats.org/officeDocument/2006/relationships" xmlns:p="http://schemas.openxmlformats.org/presentationml/2006/main">
+  <p:cSld>
+    <p:spTree>
+      <p:nvGrpSpPr>
+        <p:cNvPr id="1" name=""/>
+        <p:cNvGrpSpPr/>
+        <p:nvPr/>
+      </p:nvGrpSpPr>
+      <p:grpSpPr>
+        <a:xfrm>
+          <a:off x="0" y="0"/>
+          <a:ext cx="0" cy="0"/>
+          <a:chOff x="0" y="0"/>
+          <a:chExt cx="0" cy="0"/>
+        </a:xfrm>
+      </p:grpSpPr>
+      <p:sp>
+        <p:nvSpPr>
+          <p:cNvPr id="2" name="Title 1">
+            <a:extLst>
+              <a:ext uri="{FF2B5EF4-FFF2-40B4-BE49-F238E27FC236}">
+                <a16:creationId xmlns:a16="http://schemas.microsoft.com/office/drawing/2014/main" id="{94E7DA5E-F78C-1916-2904-D92DC8680545}"/>
+              </a:ext>
+            </a:extLst>
+          </p:cNvPr>
+          <p:cNvSpPr>
+            <a:spLocks noGrp="1"/>
+          </p:cNvSpPr>
+          <p:nvPr>
+            <p:ph type="title"/>
+          </p:nvPr>
+        </p:nvSpPr>
+        <p:spPr/>
+        <p:txBody>
+          <a:bodyPr/>
+          <a:lstStyle/>
+          <a:p>
+            <a:r>
+              <a:rPr lang="en-US" dirty="0"/>
+              <a:t>Evolution</a:t>
+            </a:r>
+          </a:p>
+        </p:txBody>
+      </p:sp>
+      <p:sp>
+        <p:nvSpPr>
+          <p:cNvPr id="3" name="Content Placeholder 2">
+            <a:extLst>
+              <a:ext uri="{FF2B5EF4-FFF2-40B4-BE49-F238E27FC236}">
+                <a16:creationId xmlns:a16="http://schemas.microsoft.com/office/drawing/2014/main" id="{03098E5D-B70E-FE27-6D02-4DB30AE8B82E}"/>
+              </a:ext>
+            </a:extLst>
+          </p:cNvPr>
+          <p:cNvSpPr>
+            <a:spLocks noGrp="1"/>
+          </p:cNvSpPr>
+          <p:nvPr>
+            <p:ph idx="1"/>
+          </p:nvPr>
+        </p:nvSpPr>
+        <p:spPr/>
+        <p:txBody>
+          <a:bodyPr>
+            <a:normAutofit lnSpcReduction="10000"/>
+          </a:bodyPr>
+          <a:lstStyle/>
+          <a:p>
+            <a:r>
+              <a:rPr lang="en-US" dirty="0"/>
+              <a:t>Queue based</a:t>
+            </a:r>
+          </a:p>
+          <a:p>
+            <a:pPr lvl="1"/>
+            <a:r>
+              <a:rPr lang="en-US" dirty="0">
+                <a:hlinkClick r:id="rId2"/>
+              </a:rPr>
+              <a:t>Building a Discord Bot in PowerShell and Azure Functions</a:t>
+            </a:r>
+            <a:endParaRPr lang="en-US" dirty="0"/>
+          </a:p>
+          <a:p>
+            <a:pPr lvl="2"/>
+            <a:r>
+              <a:rPr lang="en-US" dirty="0"/>
+              <a:t>Devin Rich</a:t>
+            </a:r>
+          </a:p>
+          <a:p>
+            <a:pPr lvl="1"/>
+            <a:r>
+              <a:rPr lang="en-US" dirty="0"/>
+              <a:t>Command is passed off via a queue</a:t>
+            </a:r>
+          </a:p>
+          <a:p>
+            <a:pPr lvl="1"/>
+            <a:r>
+              <a:rPr lang="en-US" dirty="0"/>
+              <a:t>Very slow, more reliable than HTTP POST chain</a:t>
+            </a:r>
+          </a:p>
+          <a:p>
+            <a:r>
+              <a:rPr lang="en-US" dirty="0"/>
+              <a:t>Durable Function</a:t>
+            </a:r>
+          </a:p>
+          <a:p>
+            <a:pPr lvl="1"/>
+            <a:r>
+              <a:rPr lang="en-US" dirty="0"/>
+              <a:t>Command is passed off via New-Orchestration</a:t>
+            </a:r>
+          </a:p>
+          <a:p>
+            <a:pPr lvl="1"/>
+            <a:r>
+              <a:rPr lang="en-US" dirty="0"/>
+              <a:t>Very storage intensive (expensive)</a:t>
+            </a:r>
+          </a:p>
+          <a:p>
+            <a:r>
+              <a:rPr lang="en-US" dirty="0"/>
+              <a:t>HTTP POST chain</a:t>
+            </a:r>
+          </a:p>
+          <a:p>
+            <a:pPr lvl="1"/>
+            <a:r>
+              <a:rPr lang="en-US" dirty="0"/>
+              <a:t>Command is passed off via HTTP POST</a:t>
+            </a:r>
+          </a:p>
+          <a:p>
+            <a:pPr lvl="1"/>
+            <a:r>
+              <a:rPr lang="en-US" dirty="0"/>
+              <a:t>Fast, but requires function keys and -</a:t>
+            </a:r>
+            <a:r>
+              <a:rPr lang="en-US" dirty="0" err="1"/>
+              <a:t>TimeoutSec</a:t>
+            </a:r>
+            <a:endParaRPr lang="en-US" dirty="0"/>
+          </a:p>
+        </p:txBody>
+      </p:sp>
+    </p:spTree>
+    <p:extLst>
+      <p:ext uri="{BB962C8B-B14F-4D97-AF65-F5344CB8AC3E}">
+        <p14:creationId xmlns:p14="http://schemas.microsoft.com/office/powerpoint/2010/main" val="964659942"/>
       </p:ext>
     </p:extLst>
   </p:cSld>
@@ -4451,7 +4857,9 @@
         </p:nvSpPr>
         <p:spPr/>
         <p:txBody>
-          <a:bodyPr/>
+          <a:bodyPr>
+            <a:normAutofit/>
+          </a:bodyPr>
           <a:lstStyle/>
           <a:p>
             <a:r>
@@ -4474,6 +4882,24 @@
           <a:p>
             <a:r>
               <a:rPr lang="en-US" dirty="0"/>
+              <a:t>Creating a Discord bot</a:t>
+            </a:r>
+          </a:p>
+          <a:p>
+            <a:r>
+              <a:rPr lang="en-US" dirty="0"/>
+              <a:t>Avoiding frostbite</a:t>
+            </a:r>
+          </a:p>
+          <a:p>
+            <a:r>
+              <a:rPr lang="en-US" dirty="0"/>
+              <a:t>The code itself</a:t>
+            </a:r>
+          </a:p>
+          <a:p>
+            <a:r>
+              <a:rPr lang="en-US" dirty="0"/>
               <a:t>Command addition process</a:t>
             </a:r>
           </a:p>
@@ -4481,27 +4907,6 @@
             <a:r>
               <a:rPr lang="en-US" dirty="0"/>
               <a:t>Evolution</a:t>
-            </a:r>
-          </a:p>
-          <a:p>
-            <a:pPr lvl="1"/>
-            <a:r>
-              <a:rPr lang="en-US" dirty="0"/>
-              <a:t>Queue based</a:t>
-            </a:r>
-          </a:p>
-          <a:p>
-            <a:pPr lvl="1"/>
-            <a:r>
-              <a:rPr lang="en-US" dirty="0"/>
-              <a:t>Durable Function</a:t>
-            </a:r>
-          </a:p>
-          <a:p>
-            <a:pPr lvl="1"/>
-            <a:r>
-              <a:rPr lang="en-US" dirty="0"/>
-              <a:t>HTTP Post chain</a:t>
             </a:r>
           </a:p>
         </p:txBody>

</xml_diff>

<commit_message>
adding code review step
</commit_message>
<xml_diff>
--- a/2023-04-26 - Building a serverless Discord bot/PowerShell Summit 2023 - Serverless Discord bot.pptx
+++ b/2023-04-26 - Building a serverless Discord bot/PowerShell Summit 2023 - Serverless Discord bot.pptx
@@ -19,9 +19,10 @@
     <p:sldId id="281" r:id="rId13"/>
     <p:sldId id="284" r:id="rId14"/>
     <p:sldId id="286" r:id="rId15"/>
-    <p:sldId id="282" r:id="rId16"/>
-    <p:sldId id="283" r:id="rId17"/>
-    <p:sldId id="285" r:id="rId18"/>
+    <p:sldId id="287" r:id="rId16"/>
+    <p:sldId id="282" r:id="rId17"/>
+    <p:sldId id="283" r:id="rId18"/>
+    <p:sldId id="285" r:id="rId19"/>
   </p:sldIdLst>
   <p:sldSz cx="12192000" cy="6858000"/>
   <p:notesSz cx="6858000" cy="9144000"/>
@@ -275,7 +276,7 @@
           <a:p>
             <a:fld id="{D46B952B-F692-4DD1-9678-FCDA40C3FC40}" type="datetimeFigureOut">
               <a:rPr lang="en-US" smtClean="0"/>
-              <a:t>4/2/2023</a:t>
+              <a:t>4/4/2023</a:t>
             </a:fld>
             <a:endParaRPr lang="en-US"/>
           </a:p>
@@ -473,7 +474,7 @@
           <a:p>
             <a:fld id="{D46B952B-F692-4DD1-9678-FCDA40C3FC40}" type="datetimeFigureOut">
               <a:rPr lang="en-US" smtClean="0"/>
-              <a:t>4/2/2023</a:t>
+              <a:t>4/4/2023</a:t>
             </a:fld>
             <a:endParaRPr lang="en-US"/>
           </a:p>
@@ -681,7 +682,7 @@
           <a:p>
             <a:fld id="{D46B952B-F692-4DD1-9678-FCDA40C3FC40}" type="datetimeFigureOut">
               <a:rPr lang="en-US" smtClean="0"/>
-              <a:t>4/2/2023</a:t>
+              <a:t>4/4/2023</a:t>
             </a:fld>
             <a:endParaRPr lang="en-US"/>
           </a:p>
@@ -879,7 +880,7 @@
           <a:p>
             <a:fld id="{D46B952B-F692-4DD1-9678-FCDA40C3FC40}" type="datetimeFigureOut">
               <a:rPr lang="en-US" smtClean="0"/>
-              <a:t>4/2/2023</a:t>
+              <a:t>4/4/2023</a:t>
             </a:fld>
             <a:endParaRPr lang="en-US"/>
           </a:p>
@@ -1154,7 +1155,7 @@
           <a:p>
             <a:fld id="{D46B952B-F692-4DD1-9678-FCDA40C3FC40}" type="datetimeFigureOut">
               <a:rPr lang="en-US" smtClean="0"/>
-              <a:t>4/2/2023</a:t>
+              <a:t>4/4/2023</a:t>
             </a:fld>
             <a:endParaRPr lang="en-US"/>
           </a:p>
@@ -1419,7 +1420,7 @@
           <a:p>
             <a:fld id="{D46B952B-F692-4DD1-9678-FCDA40C3FC40}" type="datetimeFigureOut">
               <a:rPr lang="en-US" smtClean="0"/>
-              <a:t>4/2/2023</a:t>
+              <a:t>4/4/2023</a:t>
             </a:fld>
             <a:endParaRPr lang="en-US"/>
           </a:p>
@@ -1831,7 +1832,7 @@
           <a:p>
             <a:fld id="{D46B952B-F692-4DD1-9678-FCDA40C3FC40}" type="datetimeFigureOut">
               <a:rPr lang="en-US" smtClean="0"/>
-              <a:t>4/2/2023</a:t>
+              <a:t>4/4/2023</a:t>
             </a:fld>
             <a:endParaRPr lang="en-US"/>
           </a:p>
@@ -1972,7 +1973,7 @@
           <a:p>
             <a:fld id="{D46B952B-F692-4DD1-9678-FCDA40C3FC40}" type="datetimeFigureOut">
               <a:rPr lang="en-US" smtClean="0"/>
-              <a:t>4/2/2023</a:t>
+              <a:t>4/4/2023</a:t>
             </a:fld>
             <a:endParaRPr lang="en-US"/>
           </a:p>
@@ -2085,7 +2086,7 @@
           <a:p>
             <a:fld id="{D46B952B-F692-4DD1-9678-FCDA40C3FC40}" type="datetimeFigureOut">
               <a:rPr lang="en-US" smtClean="0"/>
-              <a:t>4/2/2023</a:t>
+              <a:t>4/4/2023</a:t>
             </a:fld>
             <a:endParaRPr lang="en-US"/>
           </a:p>
@@ -2396,7 +2397,7 @@
           <a:p>
             <a:fld id="{D46B952B-F692-4DD1-9678-FCDA40C3FC40}" type="datetimeFigureOut">
               <a:rPr lang="en-US" smtClean="0"/>
-              <a:t>4/2/2023</a:t>
+              <a:t>4/4/2023</a:t>
             </a:fld>
             <a:endParaRPr lang="en-US"/>
           </a:p>
@@ -2684,7 +2685,7 @@
           <a:p>
             <a:fld id="{D46B952B-F692-4DD1-9678-FCDA40C3FC40}" type="datetimeFigureOut">
               <a:rPr lang="en-US" smtClean="0"/>
-              <a:t>4/2/2023</a:t>
+              <a:t>4/4/2023</a:t>
             </a:fld>
             <a:endParaRPr lang="en-US"/>
           </a:p>
@@ -2934,7 +2935,7 @@
           <a:p>
             <a:fld id="{D46B952B-F692-4DD1-9678-FCDA40C3FC40}" type="datetimeFigureOut">
               <a:rPr lang="en-US" smtClean="0"/>
-              <a:t>4/2/2023</a:t>
+              <a:t>4/4/2023</a:t>
             </a:fld>
             <a:endParaRPr lang="en-US"/>
           </a:p>
@@ -3961,7 +3962,7 @@
           <p:cNvPr id="2" name="Title 1">
             <a:extLst>
               <a:ext uri="{FF2B5EF4-FFF2-40B4-BE49-F238E27FC236}">
-                <a16:creationId xmlns:a16="http://schemas.microsoft.com/office/drawing/2014/main" id="{FBECC900-50CE-6143-BD63-0FD41482F713}"/>
+                <a16:creationId xmlns:a16="http://schemas.microsoft.com/office/drawing/2014/main" id="{F0E90596-D92B-856E-7CAA-EDE2058C101B}"/>
               </a:ext>
             </a:extLst>
           </p:cNvPr>
@@ -3977,10 +3978,7 @@
           <a:bodyPr/>
           <a:lstStyle/>
           <a:p>
-            <a:r>
-              <a:rPr lang="en-US" dirty="0"/>
-              <a:t>Adding Commands</a:t>
-            </a:r>
+            <a:endParaRPr lang="en-US"/>
           </a:p>
         </p:txBody>
       </p:sp>
@@ -3989,7 +3987,7 @@
           <p:cNvPr id="3" name="Text Placeholder 2">
             <a:extLst>
               <a:ext uri="{FF2B5EF4-FFF2-40B4-BE49-F238E27FC236}">
-                <a16:creationId xmlns:a16="http://schemas.microsoft.com/office/drawing/2014/main" id="{F94C90DE-EBD1-BFFB-B969-40F7A7127CF4}"/>
+                <a16:creationId xmlns:a16="http://schemas.microsoft.com/office/drawing/2014/main" id="{2267A0A5-C1D1-975E-8D0F-40962DC299C6}"/>
               </a:ext>
             </a:extLst>
           </p:cNvPr>
@@ -4005,14 +4003,25 @@
           <a:bodyPr/>
           <a:lstStyle/>
           <a:p>
-            <a:endParaRPr lang="en-US"/>
+            <a:r>
+              <a:rPr lang="en-US" dirty="0">
+                <a:solidFill>
+                  <a:schemeClr val="tx1"/>
+                </a:solidFill>
+                <a:latin typeface="Consolas" panose="020B0609020204030204" pitchFamily="49" charset="0"/>
+              </a:rPr>
+              <a:t>Full function code review…</a:t>
+            </a:r>
+          </a:p>
+          <a:p>
+            <a:endParaRPr lang="en-US" dirty="0"/>
           </a:p>
         </p:txBody>
       </p:sp>
     </p:spTree>
     <p:extLst>
       <p:ext uri="{BB962C8B-B14F-4D97-AF65-F5344CB8AC3E}">
-        <p14:creationId xmlns:p14="http://schemas.microsoft.com/office/powerpoint/2010/main" val="3143325720"/>
+        <p14:creationId xmlns:p14="http://schemas.microsoft.com/office/powerpoint/2010/main" val="1124600913"/>
       </p:ext>
     </p:extLst>
   </p:cSld>
@@ -4044,6 +4053,89 @@
           <p:cNvPr id="2" name="Title 1">
             <a:extLst>
               <a:ext uri="{FF2B5EF4-FFF2-40B4-BE49-F238E27FC236}">
+                <a16:creationId xmlns:a16="http://schemas.microsoft.com/office/drawing/2014/main" id="{FBECC900-50CE-6143-BD63-0FD41482F713}"/>
+              </a:ext>
+            </a:extLst>
+          </p:cNvPr>
+          <p:cNvSpPr>
+            <a:spLocks noGrp="1"/>
+          </p:cNvSpPr>
+          <p:nvPr>
+            <p:ph type="title"/>
+          </p:nvPr>
+        </p:nvSpPr>
+        <p:spPr/>
+        <p:txBody>
+          <a:bodyPr/>
+          <a:lstStyle/>
+          <a:p>
+            <a:r>
+              <a:rPr lang="en-US" dirty="0"/>
+              <a:t>Adding Commands</a:t>
+            </a:r>
+          </a:p>
+        </p:txBody>
+      </p:sp>
+      <p:sp>
+        <p:nvSpPr>
+          <p:cNvPr id="3" name="Text Placeholder 2">
+            <a:extLst>
+              <a:ext uri="{FF2B5EF4-FFF2-40B4-BE49-F238E27FC236}">
+                <a16:creationId xmlns:a16="http://schemas.microsoft.com/office/drawing/2014/main" id="{F94C90DE-EBD1-BFFB-B969-40F7A7127CF4}"/>
+              </a:ext>
+            </a:extLst>
+          </p:cNvPr>
+          <p:cNvSpPr>
+            <a:spLocks noGrp="1"/>
+          </p:cNvSpPr>
+          <p:nvPr>
+            <p:ph type="body" idx="1"/>
+          </p:nvPr>
+        </p:nvSpPr>
+        <p:spPr/>
+        <p:txBody>
+          <a:bodyPr/>
+          <a:lstStyle/>
+          <a:p>
+            <a:endParaRPr lang="en-US"/>
+          </a:p>
+        </p:txBody>
+      </p:sp>
+    </p:spTree>
+    <p:extLst>
+      <p:ext uri="{BB962C8B-B14F-4D97-AF65-F5344CB8AC3E}">
+        <p14:creationId xmlns:p14="http://schemas.microsoft.com/office/powerpoint/2010/main" val="3143325720"/>
+      </p:ext>
+    </p:extLst>
+  </p:cSld>
+  <p:clrMapOvr>
+    <a:masterClrMapping/>
+  </p:clrMapOvr>
+</p:sld>
+</file>
+
+<file path=ppt/slides/slide17.xml><?xml version="1.0" encoding="utf-8"?>
+<p:sld xmlns:a="http://schemas.openxmlformats.org/drawingml/2006/main" xmlns:r="http://schemas.openxmlformats.org/officeDocument/2006/relationships" xmlns:p="http://schemas.openxmlformats.org/presentationml/2006/main">
+  <p:cSld>
+    <p:spTree>
+      <p:nvGrpSpPr>
+        <p:cNvPr id="1" name=""/>
+        <p:cNvGrpSpPr/>
+        <p:nvPr/>
+      </p:nvGrpSpPr>
+      <p:grpSpPr>
+        <a:xfrm>
+          <a:off x="0" y="0"/>
+          <a:ext cx="0" cy="0"/>
+          <a:chOff x="0" y="0"/>
+          <a:chExt cx="0" cy="0"/>
+        </a:xfrm>
+      </p:grpSpPr>
+      <p:sp>
+        <p:nvSpPr>
+          <p:cNvPr id="2" name="Title 1">
+            <a:extLst>
+              <a:ext uri="{FF2B5EF4-FFF2-40B4-BE49-F238E27FC236}">
                 <a16:creationId xmlns:a16="http://schemas.microsoft.com/office/drawing/2014/main" id="{18133B67-FEE0-DF4C-4D80-404858A55DF3}"/>
               </a:ext>
             </a:extLst>
@@ -4110,7 +4202,7 @@
 </p:sld>
 </file>
 
-<file path=ppt/slides/slide17.xml><?xml version="1.0" encoding="utf-8"?>
+<file path=ppt/slides/slide18.xml><?xml version="1.0" encoding="utf-8"?>
 <p:sld xmlns:a="http://schemas.openxmlformats.org/drawingml/2006/main" xmlns:r="http://schemas.openxmlformats.org/officeDocument/2006/relationships" xmlns:p="http://schemas.openxmlformats.org/presentationml/2006/main">
   <p:cSld>
     <p:spTree>

</xml_diff>

<commit_message>
adding slide about command types
</commit_message>
<xml_diff>
--- a/2023-04-26 - Building a serverless Discord bot/PowerShell Summit 2023 - Serverless Discord bot.pptx
+++ b/2023-04-26 - Building a serverless Discord bot/PowerShell Summit 2023 - Serverless Discord bot.pptx
@@ -21,8 +21,9 @@
     <p:sldId id="286" r:id="rId15"/>
     <p:sldId id="287" r:id="rId16"/>
     <p:sldId id="282" r:id="rId17"/>
-    <p:sldId id="283" r:id="rId18"/>
-    <p:sldId id="285" r:id="rId19"/>
+    <p:sldId id="288" r:id="rId18"/>
+    <p:sldId id="283" r:id="rId19"/>
+    <p:sldId id="285" r:id="rId20"/>
   </p:sldIdLst>
   <p:sldSz cx="12192000" cy="6858000"/>
   <p:notesSz cx="6858000" cy="9144000"/>
@@ -276,7 +277,7 @@
           <a:p>
             <a:fld id="{D46B952B-F692-4DD1-9678-FCDA40C3FC40}" type="datetimeFigureOut">
               <a:rPr lang="en-US" smtClean="0"/>
-              <a:t>4/4/2023</a:t>
+              <a:t>4/9/2023</a:t>
             </a:fld>
             <a:endParaRPr lang="en-US"/>
           </a:p>
@@ -474,7 +475,7 @@
           <a:p>
             <a:fld id="{D46B952B-F692-4DD1-9678-FCDA40C3FC40}" type="datetimeFigureOut">
               <a:rPr lang="en-US" smtClean="0"/>
-              <a:t>4/4/2023</a:t>
+              <a:t>4/9/2023</a:t>
             </a:fld>
             <a:endParaRPr lang="en-US"/>
           </a:p>
@@ -682,7 +683,7 @@
           <a:p>
             <a:fld id="{D46B952B-F692-4DD1-9678-FCDA40C3FC40}" type="datetimeFigureOut">
               <a:rPr lang="en-US" smtClean="0"/>
-              <a:t>4/4/2023</a:t>
+              <a:t>4/9/2023</a:t>
             </a:fld>
             <a:endParaRPr lang="en-US"/>
           </a:p>
@@ -880,7 +881,7 @@
           <a:p>
             <a:fld id="{D46B952B-F692-4DD1-9678-FCDA40C3FC40}" type="datetimeFigureOut">
               <a:rPr lang="en-US" smtClean="0"/>
-              <a:t>4/4/2023</a:t>
+              <a:t>4/9/2023</a:t>
             </a:fld>
             <a:endParaRPr lang="en-US"/>
           </a:p>
@@ -1155,7 +1156,7 @@
           <a:p>
             <a:fld id="{D46B952B-F692-4DD1-9678-FCDA40C3FC40}" type="datetimeFigureOut">
               <a:rPr lang="en-US" smtClean="0"/>
-              <a:t>4/4/2023</a:t>
+              <a:t>4/9/2023</a:t>
             </a:fld>
             <a:endParaRPr lang="en-US"/>
           </a:p>
@@ -1420,7 +1421,7 @@
           <a:p>
             <a:fld id="{D46B952B-F692-4DD1-9678-FCDA40C3FC40}" type="datetimeFigureOut">
               <a:rPr lang="en-US" smtClean="0"/>
-              <a:t>4/4/2023</a:t>
+              <a:t>4/9/2023</a:t>
             </a:fld>
             <a:endParaRPr lang="en-US"/>
           </a:p>
@@ -1832,7 +1833,7 @@
           <a:p>
             <a:fld id="{D46B952B-F692-4DD1-9678-FCDA40C3FC40}" type="datetimeFigureOut">
               <a:rPr lang="en-US" smtClean="0"/>
-              <a:t>4/4/2023</a:t>
+              <a:t>4/9/2023</a:t>
             </a:fld>
             <a:endParaRPr lang="en-US"/>
           </a:p>
@@ -1973,7 +1974,7 @@
           <a:p>
             <a:fld id="{D46B952B-F692-4DD1-9678-FCDA40C3FC40}" type="datetimeFigureOut">
               <a:rPr lang="en-US" smtClean="0"/>
-              <a:t>4/4/2023</a:t>
+              <a:t>4/9/2023</a:t>
             </a:fld>
             <a:endParaRPr lang="en-US"/>
           </a:p>
@@ -2086,7 +2087,7 @@
           <a:p>
             <a:fld id="{D46B952B-F692-4DD1-9678-FCDA40C3FC40}" type="datetimeFigureOut">
               <a:rPr lang="en-US" smtClean="0"/>
-              <a:t>4/4/2023</a:t>
+              <a:t>4/9/2023</a:t>
             </a:fld>
             <a:endParaRPr lang="en-US"/>
           </a:p>
@@ -2397,7 +2398,7 @@
           <a:p>
             <a:fld id="{D46B952B-F692-4DD1-9678-FCDA40C3FC40}" type="datetimeFigureOut">
               <a:rPr lang="en-US" smtClean="0"/>
-              <a:t>4/4/2023</a:t>
+              <a:t>4/9/2023</a:t>
             </a:fld>
             <a:endParaRPr lang="en-US"/>
           </a:p>
@@ -2685,7 +2686,7 @@
           <a:p>
             <a:fld id="{D46B952B-F692-4DD1-9678-FCDA40C3FC40}" type="datetimeFigureOut">
               <a:rPr lang="en-US" smtClean="0"/>
-              <a:t>4/4/2023</a:t>
+              <a:t>4/9/2023</a:t>
             </a:fld>
             <a:endParaRPr lang="en-US"/>
           </a:p>
@@ -2935,7 +2936,7 @@
           <a:p>
             <a:fld id="{D46B952B-F692-4DD1-9678-FCDA40C3FC40}" type="datetimeFigureOut">
               <a:rPr lang="en-US" smtClean="0"/>
-              <a:t>4/4/2023</a:t>
+              <a:t>4/9/2023</a:t>
             </a:fld>
             <a:endParaRPr lang="en-US"/>
           </a:p>
@@ -4136,6 +4137,127 @@
           <p:cNvPr id="2" name="Title 1">
             <a:extLst>
               <a:ext uri="{FF2B5EF4-FFF2-40B4-BE49-F238E27FC236}">
+                <a16:creationId xmlns:a16="http://schemas.microsoft.com/office/drawing/2014/main" id="{FE06D3E5-4ABA-FCFA-4F84-AEE01DA4566C}"/>
+              </a:ext>
+            </a:extLst>
+          </p:cNvPr>
+          <p:cNvSpPr>
+            <a:spLocks noGrp="1"/>
+          </p:cNvSpPr>
+          <p:nvPr>
+            <p:ph type="title"/>
+          </p:nvPr>
+        </p:nvSpPr>
+        <p:spPr/>
+        <p:txBody>
+          <a:bodyPr/>
+          <a:lstStyle/>
+          <a:p>
+            <a:r>
+              <a:rPr lang="en-US" dirty="0"/>
+              <a:t>Command Types</a:t>
+            </a:r>
+          </a:p>
+        </p:txBody>
+      </p:sp>
+      <p:sp>
+        <p:nvSpPr>
+          <p:cNvPr id="3" name="Content Placeholder 2">
+            <a:extLst>
+              <a:ext uri="{FF2B5EF4-FFF2-40B4-BE49-F238E27FC236}">
+                <a16:creationId xmlns:a16="http://schemas.microsoft.com/office/drawing/2014/main" id="{C15EFAF7-3ED1-6A70-FD7D-48CC2B6795D6}"/>
+              </a:ext>
+            </a:extLst>
+          </p:cNvPr>
+          <p:cNvSpPr>
+            <a:spLocks noGrp="1"/>
+          </p:cNvSpPr>
+          <p:nvPr>
+            <p:ph idx="1"/>
+          </p:nvPr>
+        </p:nvSpPr>
+        <p:spPr/>
+        <p:txBody>
+          <a:bodyPr/>
+          <a:lstStyle/>
+          <a:p>
+            <a:r>
+              <a:rPr lang="en-US" dirty="0"/>
+              <a:t>Application (Global)</a:t>
+            </a:r>
+          </a:p>
+          <a:p>
+            <a:pPr lvl="1"/>
+            <a:r>
+              <a:rPr lang="en-US" dirty="0"/>
+              <a:t>Applies to all servers</a:t>
+            </a:r>
+          </a:p>
+          <a:p>
+            <a:pPr lvl="1"/>
+            <a:r>
+              <a:rPr lang="en-US" dirty="0"/>
+              <a:t>Slow propagation</a:t>
+            </a:r>
+          </a:p>
+          <a:p>
+            <a:r>
+              <a:rPr lang="en-US" dirty="0"/>
+              <a:t>Guild (Server)</a:t>
+            </a:r>
+          </a:p>
+          <a:p>
+            <a:pPr lvl="1"/>
+            <a:r>
+              <a:rPr lang="en-US" dirty="0"/>
+              <a:t>Applies to a specific server</a:t>
+            </a:r>
+          </a:p>
+          <a:p>
+            <a:pPr lvl="1"/>
+            <a:r>
+              <a:rPr lang="en-US"/>
+              <a:t>Instant propagation</a:t>
+            </a:r>
+            <a:endParaRPr lang="en-US" dirty="0"/>
+          </a:p>
+        </p:txBody>
+      </p:sp>
+    </p:spTree>
+    <p:extLst>
+      <p:ext uri="{BB962C8B-B14F-4D97-AF65-F5344CB8AC3E}">
+        <p14:creationId xmlns:p14="http://schemas.microsoft.com/office/powerpoint/2010/main" val="3619535768"/>
+      </p:ext>
+    </p:extLst>
+  </p:cSld>
+  <p:clrMapOvr>
+    <a:masterClrMapping/>
+  </p:clrMapOvr>
+</p:sld>
+</file>
+
+<file path=ppt/slides/slide18.xml><?xml version="1.0" encoding="utf-8"?>
+<p:sld xmlns:a="http://schemas.openxmlformats.org/drawingml/2006/main" xmlns:r="http://schemas.openxmlformats.org/officeDocument/2006/relationships" xmlns:p="http://schemas.openxmlformats.org/presentationml/2006/main">
+  <p:cSld>
+    <p:spTree>
+      <p:nvGrpSpPr>
+        <p:cNvPr id="1" name=""/>
+        <p:cNvGrpSpPr/>
+        <p:nvPr/>
+      </p:nvGrpSpPr>
+      <p:grpSpPr>
+        <a:xfrm>
+          <a:off x="0" y="0"/>
+          <a:ext cx="0" cy="0"/>
+          <a:chOff x="0" y="0"/>
+          <a:chExt cx="0" cy="0"/>
+        </a:xfrm>
+      </p:grpSpPr>
+      <p:sp>
+        <p:nvSpPr>
+          <p:cNvPr id="2" name="Title 1">
+            <a:extLst>
+              <a:ext uri="{FF2B5EF4-FFF2-40B4-BE49-F238E27FC236}">
                 <a16:creationId xmlns:a16="http://schemas.microsoft.com/office/drawing/2014/main" id="{18133B67-FEE0-DF4C-4D80-404858A55DF3}"/>
               </a:ext>
             </a:extLst>
@@ -4202,7 +4324,7 @@
 </p:sld>
 </file>
 
-<file path=ppt/slides/slide18.xml><?xml version="1.0" encoding="utf-8"?>
+<file path=ppt/slides/slide19.xml><?xml version="1.0" encoding="utf-8"?>
 <p:sld xmlns:a="http://schemas.openxmlformats.org/drawingml/2006/main" xmlns:r="http://schemas.openxmlformats.org/officeDocument/2006/relationships" xmlns:p="http://schemas.openxmlformats.org/presentationml/2006/main">
   <p:cSld>
     <p:spTree>

</xml_diff>